<commit_message>
updated the pp slides
</commit_message>
<xml_diff>
--- a/DCATL2011.pptx
+++ b/DCATL2011.pptx
@@ -9000,6 +9000,13 @@
   <p:clrMapOvr>
     <a:masterClrMapping/>
   </p:clrMapOvr>
+  <p:timing>
+    <p:tnLst>
+      <p:par>
+        <p:cTn xmlns:p14="http://schemas.microsoft.com/office/powerpoint/2010/main" id="1" dur="indefinite" restart="never" nodeType="tmRoot"/>
+      </p:par>
+    </p:tnLst>
+  </p:timing>
 </p:sld>
 </file>
 
@@ -9104,30 +9111,24 @@
               <a:buNone/>
             </a:pPr>
             <a:r>
-              <a:rPr lang="en-US">
+              <a:rPr lang="en-US" dirty="0">
                 <a:hlinkClick r:id="rId3"/>
               </a:rPr>
-              <a:t>http://www.w3.org/TR/css3-</a:t>
-            </a:r>
-            <a:r>
-              <a:rPr lang="en-US">
-                <a:hlinkClick r:id="rId3"/>
-              </a:rPr>
-              <a:t>mediaqueries</a:t>
-            </a:r>
-            <a:r>
-              <a:rPr lang="en-US" smtClean="0">
+              <a:t>http://www.w3.org/TR/css3-mediaqueries</a:t>
+            </a:r>
+            <a:r>
+              <a:rPr lang="en-US" dirty="0" smtClean="0">
                 <a:hlinkClick r:id="rId3"/>
               </a:rPr>
               <a:t>/</a:t>
             </a:r>
-            <a:endParaRPr lang="en-US" smtClean="0"/>
+            <a:endParaRPr lang="en-US" dirty="0" smtClean="0"/>
           </a:p>
           <a:p>
             <a:pPr marL="0" indent="0">
               <a:buNone/>
             </a:pPr>
-            <a:endParaRPr lang="en-US" smtClean="0"/>
+            <a:endParaRPr lang="en-US" dirty="0" smtClean="0"/>
           </a:p>
           <a:p>
             <a:pPr marL="0" indent="0">
@@ -9147,6 +9148,13 @@
   <p:clrMapOvr>
     <a:masterClrMapping/>
   </p:clrMapOvr>
+  <p:timing>
+    <p:tnLst>
+      <p:par>
+        <p:cTn xmlns:p14="http://schemas.microsoft.com/office/powerpoint/2010/main" id="1" dur="indefinite" restart="never" nodeType="tmRoot"/>
+      </p:par>
+    </p:tnLst>
+  </p:timing>
 </p:sld>
 </file>
 
@@ -9210,17 +9218,13 @@
             </a:pPr>
             <a:r>
               <a:rPr lang="en-US" dirty="0" smtClean="0"/>
-              <a:t>Demonstrate a basic knowledge base of tools that can help create an adaptable, responsive application.</a:t>
-            </a:r>
-          </a:p>
-          <a:p>
-            <a:pPr marL="0" indent="0">
-              <a:buNone/>
-            </a:pPr>
-            <a:r>
-              <a:rPr lang="en-US" dirty="0" smtClean="0"/>
-              <a:t>How to combine those tools into a single application that can provide a unique interface for users to access the same data and content no matter how the content is accessed.</a:t>
-            </a:r>
+              <a:t>Show off a few cool tools that can help anyone build a responsive app or theme that serve the same content through </a:t>
+            </a:r>
+            <a:r>
+              <a:rPr lang="en-US" smtClean="0"/>
+              <a:t>any media.</a:t>
+            </a:r>
+            <a:endParaRPr lang="en-US" dirty="0" smtClean="0"/>
           </a:p>
           <a:p>
             <a:pPr marL="0" indent="0">

</xml_diff>